<commit_message>
Fixed bug with saving polarion excel
</commit_message>
<xml_diff>
--- a/design/graphics.pptx
+++ b/design/graphics.pptx
@@ -243,7 +243,7 @@
           <a:p>
             <a:fld id="{CC3BE8E3-77CC-4B13-A1CD-E42BB7833108}" type="datetimeFigureOut">
               <a:rPr lang="en-US" smtClean="0"/>
-              <a:t>10/23/2018</a:t>
+              <a:t>5/15/2019</a:t>
             </a:fld>
             <a:endParaRPr lang="en-US"/>
           </a:p>
@@ -413,7 +413,7 @@
           <a:p>
             <a:fld id="{CC3BE8E3-77CC-4B13-A1CD-E42BB7833108}" type="datetimeFigureOut">
               <a:rPr lang="en-US" smtClean="0"/>
-              <a:t>10/23/2018</a:t>
+              <a:t>5/15/2019</a:t>
             </a:fld>
             <a:endParaRPr lang="en-US"/>
           </a:p>
@@ -593,7 +593,7 @@
           <a:p>
             <a:fld id="{CC3BE8E3-77CC-4B13-A1CD-E42BB7833108}" type="datetimeFigureOut">
               <a:rPr lang="en-US" smtClean="0"/>
-              <a:t>10/23/2018</a:t>
+              <a:t>5/15/2019</a:t>
             </a:fld>
             <a:endParaRPr lang="en-US"/>
           </a:p>
@@ -763,7 +763,7 @@
           <a:p>
             <a:fld id="{CC3BE8E3-77CC-4B13-A1CD-E42BB7833108}" type="datetimeFigureOut">
               <a:rPr lang="en-US" smtClean="0"/>
-              <a:t>10/23/2018</a:t>
+              <a:t>5/15/2019</a:t>
             </a:fld>
             <a:endParaRPr lang="en-US"/>
           </a:p>
@@ -1009,7 +1009,7 @@
           <a:p>
             <a:fld id="{CC3BE8E3-77CC-4B13-A1CD-E42BB7833108}" type="datetimeFigureOut">
               <a:rPr lang="en-US" smtClean="0"/>
-              <a:t>10/23/2018</a:t>
+              <a:t>5/15/2019</a:t>
             </a:fld>
             <a:endParaRPr lang="en-US"/>
           </a:p>
@@ -1241,7 +1241,7 @@
           <a:p>
             <a:fld id="{CC3BE8E3-77CC-4B13-A1CD-E42BB7833108}" type="datetimeFigureOut">
               <a:rPr lang="en-US" smtClean="0"/>
-              <a:t>10/23/2018</a:t>
+              <a:t>5/15/2019</a:t>
             </a:fld>
             <a:endParaRPr lang="en-US"/>
           </a:p>
@@ -1608,7 +1608,7 @@
           <a:p>
             <a:fld id="{CC3BE8E3-77CC-4B13-A1CD-E42BB7833108}" type="datetimeFigureOut">
               <a:rPr lang="en-US" smtClean="0"/>
-              <a:t>10/23/2018</a:t>
+              <a:t>5/15/2019</a:t>
             </a:fld>
             <a:endParaRPr lang="en-US"/>
           </a:p>
@@ -1726,7 +1726,7 @@
           <a:p>
             <a:fld id="{CC3BE8E3-77CC-4B13-A1CD-E42BB7833108}" type="datetimeFigureOut">
               <a:rPr lang="en-US" smtClean="0"/>
-              <a:t>10/23/2018</a:t>
+              <a:t>5/15/2019</a:t>
             </a:fld>
             <a:endParaRPr lang="en-US"/>
           </a:p>
@@ -1821,7 +1821,7 @@
           <a:p>
             <a:fld id="{CC3BE8E3-77CC-4B13-A1CD-E42BB7833108}" type="datetimeFigureOut">
               <a:rPr lang="en-US" smtClean="0"/>
-              <a:t>10/23/2018</a:t>
+              <a:t>5/15/2019</a:t>
             </a:fld>
             <a:endParaRPr lang="en-US"/>
           </a:p>
@@ -2098,7 +2098,7 @@
           <a:p>
             <a:fld id="{CC3BE8E3-77CC-4B13-A1CD-E42BB7833108}" type="datetimeFigureOut">
               <a:rPr lang="en-US" smtClean="0"/>
-              <a:t>10/23/2018</a:t>
+              <a:t>5/15/2019</a:t>
             </a:fld>
             <a:endParaRPr lang="en-US"/>
           </a:p>
@@ -2351,7 +2351,7 @@
           <a:p>
             <a:fld id="{CC3BE8E3-77CC-4B13-A1CD-E42BB7833108}" type="datetimeFigureOut">
               <a:rPr lang="en-US" smtClean="0"/>
-              <a:t>10/23/2018</a:t>
+              <a:t>5/15/2019</a:t>
             </a:fld>
             <a:endParaRPr lang="en-US"/>
           </a:p>
@@ -2564,7 +2564,7 @@
           <a:p>
             <a:fld id="{CC3BE8E3-77CC-4B13-A1CD-E42BB7833108}" type="datetimeFigureOut">
               <a:rPr lang="en-US" smtClean="0"/>
-              <a:t>10/23/2018</a:t>
+              <a:t>5/15/2019</a:t>
             </a:fld>
             <a:endParaRPr lang="en-US"/>
           </a:p>
@@ -2971,407 +2971,206 @@
       </p:grpSpPr>
       <p:sp>
         <p:nvSpPr>
-          <p:cNvPr id="4" name="Rounded Rectangle 3"/>
+          <p:cNvPr id="3" name="Oval 2"/>
           <p:cNvSpPr/>
           <p:nvPr/>
         </p:nvSpPr>
         <p:spPr>
           <a:xfrm>
-            <a:off x="3856007" y="2044460"/>
-            <a:ext cx="182880" cy="182880"/>
+            <a:off x="4081254" y="2742330"/>
+            <a:ext cx="1639019" cy="1639019"/>
           </a:xfrm>
-          <a:prstGeom prst="roundRect">
+          <a:prstGeom prst="ellipse">
             <a:avLst/>
           </a:prstGeom>
-          <a:noFill/>
-          <a:ln w="6350"/>
+          <a:gradFill flip="none" rotWithShape="1">
+            <a:gsLst>
+              <a:gs pos="0">
+                <a:schemeClr val="accent3">
+                  <a:lumMod val="5000"/>
+                  <a:lumOff val="95000"/>
+                </a:schemeClr>
+              </a:gs>
+              <a:gs pos="74000">
+                <a:schemeClr val="accent3">
+                  <a:lumMod val="45000"/>
+                  <a:lumOff val="55000"/>
+                </a:schemeClr>
+              </a:gs>
+              <a:gs pos="83000">
+                <a:schemeClr val="accent3">
+                  <a:lumMod val="45000"/>
+                  <a:lumOff val="55000"/>
+                </a:schemeClr>
+              </a:gs>
+              <a:gs pos="100000">
+                <a:schemeClr val="accent3">
+                  <a:lumMod val="30000"/>
+                  <a:lumOff val="70000"/>
+                </a:schemeClr>
+              </a:gs>
+            </a:gsLst>
+            <a:path path="circle">
+              <a:fillToRect l="100000" t="100000"/>
+            </a:path>
+            <a:tileRect r="-100000" b="-100000"/>
+          </a:gradFill>
+          <a:ln>
+            <a:noFill/>
+          </a:ln>
+          <a:scene3d>
+            <a:camera prst="orthographicFront"/>
+            <a:lightRig rig="threePt" dir="t"/>
+          </a:scene3d>
+          <a:sp3d>
+            <a:bevelT prst="angle"/>
+          </a:sp3d>
         </p:spPr>
         <p:style>
           <a:lnRef idx="2">
-            <a:schemeClr val="accent3"/>
-          </a:lnRef>
-          <a:fillRef idx="1">
-            <a:schemeClr val="lt1"/>
-          </a:fillRef>
-          <a:effectRef idx="0">
-            <a:schemeClr val="accent3"/>
-          </a:effectRef>
-          <a:fontRef idx="minor">
-            <a:schemeClr val="dk1"/>
-          </a:fontRef>
-        </p:style>
-        <p:txBody>
-          <a:bodyPr rtlCol="0" anchor="ctr"/>
-          <a:lstStyle/>
-          <a:p>
-            <a:pPr algn="ctr"/>
-            <a:endParaRPr lang="en-US"/>
-          </a:p>
-        </p:txBody>
-      </p:sp>
-      <p:sp>
-        <p:nvSpPr>
-          <p:cNvPr id="5" name="Rounded Rectangle 4"/>
-          <p:cNvSpPr/>
-          <p:nvPr/>
-        </p:nvSpPr>
-        <p:spPr>
-          <a:xfrm>
-            <a:off x="3890678" y="2075321"/>
-            <a:ext cx="118872" cy="118872"/>
-          </a:xfrm>
-          <a:prstGeom prst="roundRect">
-            <a:avLst/>
-          </a:prstGeom>
-          <a:solidFill>
-            <a:schemeClr val="bg1">
-              <a:lumMod val="85000"/>
-            </a:schemeClr>
-          </a:solidFill>
-          <a:ln w="6350">
-            <a:solidFill>
-              <a:schemeClr val="bg1">
-                <a:lumMod val="85000"/>
-              </a:schemeClr>
-            </a:solidFill>
-          </a:ln>
-        </p:spPr>
-        <p:style>
-          <a:lnRef idx="2">
-            <a:schemeClr val="dk1">
+            <a:schemeClr val="accent1">
               <a:shade val="50000"/>
             </a:schemeClr>
           </a:lnRef>
           <a:fillRef idx="1">
-            <a:schemeClr val="dk1"/>
-          </a:fillRef>
-          <a:effectRef idx="0">
-            <a:schemeClr val="dk1"/>
-          </a:effectRef>
-          <a:fontRef idx="minor">
-            <a:schemeClr val="lt1"/>
-          </a:fontRef>
-        </p:style>
-        <p:txBody>
-          <a:bodyPr rtlCol="0" anchor="ctr"/>
-          <a:lstStyle/>
-          <a:p>
-            <a:pPr algn="ctr"/>
-            <a:endParaRPr lang="en-US"/>
-          </a:p>
-        </p:txBody>
-      </p:sp>
-      <p:sp>
-        <p:nvSpPr>
-          <p:cNvPr id="10" name="Rounded Rectangle 9"/>
-          <p:cNvSpPr/>
-          <p:nvPr/>
-        </p:nvSpPr>
-        <p:spPr>
-          <a:xfrm>
-            <a:off x="3457862" y="2040283"/>
-            <a:ext cx="182880" cy="182880"/>
-          </a:xfrm>
-          <a:prstGeom prst="roundRect">
-            <a:avLst/>
-          </a:prstGeom>
-          <a:noFill/>
-          <a:ln w="6350"/>
-        </p:spPr>
-        <p:style>
-          <a:lnRef idx="2">
-            <a:schemeClr val="accent3"/>
-          </a:lnRef>
-          <a:fillRef idx="1">
-            <a:schemeClr val="lt1"/>
-          </a:fillRef>
-          <a:effectRef idx="0">
-            <a:schemeClr val="accent3"/>
-          </a:effectRef>
-          <a:fontRef idx="minor">
-            <a:schemeClr val="dk1"/>
-          </a:fontRef>
-        </p:style>
-        <p:txBody>
-          <a:bodyPr rtlCol="0" anchor="ctr"/>
-          <a:lstStyle/>
-          <a:p>
-            <a:pPr algn="ctr"/>
-            <a:endParaRPr lang="en-US"/>
-          </a:p>
-        </p:txBody>
-      </p:sp>
-      <p:sp>
-        <p:nvSpPr>
-          <p:cNvPr id="11" name="Rounded Rectangle 10"/>
-          <p:cNvSpPr/>
-          <p:nvPr/>
-        </p:nvSpPr>
-        <p:spPr>
-          <a:xfrm>
-            <a:off x="3492533" y="2071144"/>
-            <a:ext cx="118872" cy="118872"/>
-          </a:xfrm>
-          <a:prstGeom prst="roundRect">
-            <a:avLst/>
-          </a:prstGeom>
-          <a:noFill/>
-          <a:ln w="6350">
-            <a:solidFill>
-              <a:schemeClr val="bg1">
-                <a:lumMod val="85000"/>
-              </a:schemeClr>
-            </a:solidFill>
-          </a:ln>
-        </p:spPr>
-        <p:style>
-          <a:lnRef idx="2">
-            <a:schemeClr val="dk1">
-              <a:shade val="50000"/>
-            </a:schemeClr>
-          </a:lnRef>
-          <a:fillRef idx="1">
-            <a:schemeClr val="dk1"/>
-          </a:fillRef>
-          <a:effectRef idx="0">
-            <a:schemeClr val="dk1"/>
-          </a:effectRef>
-          <a:fontRef idx="minor">
-            <a:schemeClr val="lt1"/>
-          </a:fontRef>
-        </p:style>
-        <p:txBody>
-          <a:bodyPr rtlCol="0" anchor="ctr"/>
-          <a:lstStyle/>
-          <a:p>
-            <a:pPr algn="ctr"/>
-            <a:endParaRPr lang="en-US"/>
-          </a:p>
-        </p:txBody>
-      </p:sp>
-      <p:sp>
-        <p:nvSpPr>
-          <p:cNvPr id="12" name="Rounded Rectangle 11"/>
-          <p:cNvSpPr/>
-          <p:nvPr/>
-        </p:nvSpPr>
-        <p:spPr>
-          <a:xfrm>
-            <a:off x="3056004" y="2037644"/>
-            <a:ext cx="182880" cy="182880"/>
-          </a:xfrm>
-          <a:prstGeom prst="roundRect">
-            <a:avLst/>
-          </a:prstGeom>
-          <a:noFill/>
-          <a:ln w="6350"/>
-        </p:spPr>
-        <p:style>
-          <a:lnRef idx="2">
-            <a:schemeClr val="accent3"/>
-          </a:lnRef>
-          <a:fillRef idx="1">
-            <a:schemeClr val="lt1"/>
-          </a:fillRef>
-          <a:effectRef idx="0">
-            <a:schemeClr val="accent3"/>
-          </a:effectRef>
-          <a:fontRef idx="minor">
-            <a:schemeClr val="dk1"/>
-          </a:fontRef>
-        </p:style>
-        <p:txBody>
-          <a:bodyPr rtlCol="0" anchor="ctr"/>
-          <a:lstStyle/>
-          <a:p>
-            <a:pPr algn="ctr"/>
-            <a:endParaRPr lang="en-US"/>
-          </a:p>
-        </p:txBody>
-      </p:sp>
-      <p:sp>
-        <p:nvSpPr>
-          <p:cNvPr id="13" name="Rounded Rectangle 12"/>
-          <p:cNvSpPr/>
-          <p:nvPr/>
-        </p:nvSpPr>
-        <p:spPr>
-          <a:xfrm>
-            <a:off x="3459864" y="2400328"/>
-            <a:ext cx="182880" cy="182880"/>
-          </a:xfrm>
-          <a:prstGeom prst="roundRect">
-            <a:avLst/>
-          </a:prstGeom>
-          <a:noFill/>
-          <a:ln w="6350"/>
-        </p:spPr>
-        <p:style>
-          <a:lnRef idx="2">
-            <a:schemeClr val="accent3"/>
-          </a:lnRef>
-          <a:fillRef idx="1">
-            <a:schemeClr val="lt1"/>
-          </a:fillRef>
-          <a:effectRef idx="0">
-            <a:schemeClr val="accent3"/>
-          </a:effectRef>
-          <a:fontRef idx="minor">
-            <a:schemeClr val="dk1"/>
-          </a:fontRef>
-        </p:style>
-        <p:txBody>
-          <a:bodyPr rtlCol="0" anchor="ctr"/>
-          <a:lstStyle/>
-          <a:p>
-            <a:pPr algn="ctr"/>
-            <a:endParaRPr lang="en-US"/>
-          </a:p>
-        </p:txBody>
-      </p:sp>
-      <p:sp>
-        <p:nvSpPr>
-          <p:cNvPr id="14" name="Rounded Rectangle 13"/>
-          <p:cNvSpPr/>
-          <p:nvPr/>
-        </p:nvSpPr>
-        <p:spPr>
-          <a:xfrm>
-            <a:off x="3494535" y="2431189"/>
-            <a:ext cx="118872" cy="118872"/>
-          </a:xfrm>
-          <a:prstGeom prst="roundRect">
-            <a:avLst/>
-          </a:prstGeom>
-          <a:noFill/>
-          <a:ln w="6350">
-            <a:solidFill>
-              <a:schemeClr val="bg1">
-                <a:lumMod val="85000"/>
-              </a:schemeClr>
-            </a:solidFill>
-          </a:ln>
-        </p:spPr>
-        <p:style>
-          <a:lnRef idx="2">
-            <a:schemeClr val="dk1">
-              <a:shade val="50000"/>
-            </a:schemeClr>
-          </a:lnRef>
-          <a:fillRef idx="1">
-            <a:schemeClr val="dk1"/>
-          </a:fillRef>
-          <a:effectRef idx="0">
-            <a:schemeClr val="dk1"/>
-          </a:effectRef>
-          <a:fontRef idx="minor">
-            <a:schemeClr val="lt1"/>
-          </a:fontRef>
-        </p:style>
-        <p:txBody>
-          <a:bodyPr rtlCol="0" anchor="ctr"/>
-          <a:lstStyle/>
-          <a:p>
-            <a:pPr algn="ctr"/>
-            <a:endParaRPr lang="en-US"/>
-          </a:p>
-        </p:txBody>
-      </p:sp>
-      <p:cxnSp>
-        <p:nvCxnSpPr>
-          <p:cNvPr id="20" name="Straight Connector 19"/>
-          <p:cNvCxnSpPr/>
-          <p:nvPr/>
-        </p:nvCxnSpPr>
-        <p:spPr>
-          <a:xfrm>
-            <a:off x="3508535" y="2447981"/>
-            <a:ext cx="91440" cy="91440"/>
-          </a:xfrm>
-          <a:prstGeom prst="line">
-            <a:avLst/>
-          </a:prstGeom>
-          <a:ln w="12700">
-            <a:solidFill>
-              <a:schemeClr val="bg1">
-                <a:lumMod val="85000"/>
-              </a:schemeClr>
-            </a:solidFill>
-          </a:ln>
-        </p:spPr>
-        <p:style>
-          <a:lnRef idx="1">
-            <a:schemeClr val="accent1"/>
-          </a:lnRef>
-          <a:fillRef idx="0">
             <a:schemeClr val="accent1"/>
           </a:fillRef>
           <a:effectRef idx="0">
             <a:schemeClr val="accent1"/>
           </a:effectRef>
           <a:fontRef idx="minor">
-            <a:schemeClr val="tx1"/>
+            <a:schemeClr val="lt1"/>
           </a:fontRef>
         </p:style>
-      </p:cxnSp>
-      <p:cxnSp>
-        <p:nvCxnSpPr>
-          <p:cNvPr id="22" name="Straight Connector 21"/>
-          <p:cNvCxnSpPr/>
+        <p:txBody>
+          <a:bodyPr rtlCol="0" anchor="ctr"/>
+          <a:lstStyle/>
+          <a:p>
+            <a:pPr algn="ctr"/>
+            <a:endParaRPr lang="en-US"/>
+          </a:p>
+        </p:txBody>
+      </p:sp>
+      <p:sp>
+        <p:nvSpPr>
+          <p:cNvPr id="16" name="Oval 15"/>
+          <p:cNvSpPr/>
           <p:nvPr/>
-        </p:nvCxnSpPr>
+        </p:nvSpPr>
         <p:spPr>
-          <a:xfrm rot="5400000">
-            <a:off x="3508535" y="2444905"/>
-            <a:ext cx="91440" cy="91440"/>
+          <a:xfrm>
+            <a:off x="4187531" y="2847464"/>
+            <a:ext cx="1426464" cy="1428750"/>
           </a:xfrm>
-          <a:prstGeom prst="line">
+          <a:prstGeom prst="ellipse">
             <a:avLst/>
           </a:prstGeom>
-          <a:ln w="12700">
-            <a:solidFill>
-              <a:schemeClr val="bg1">
-                <a:lumMod val="85000"/>
-              </a:schemeClr>
-            </a:solidFill>
+          <a:gradFill flip="none" rotWithShape="1">
+            <a:gsLst>
+              <a:gs pos="0">
+                <a:schemeClr val="accent3">
+                  <a:lumMod val="0"/>
+                  <a:lumOff val="100000"/>
+                </a:schemeClr>
+              </a:gs>
+              <a:gs pos="35000">
+                <a:schemeClr val="accent3">
+                  <a:lumMod val="0"/>
+                  <a:lumOff val="100000"/>
+                </a:schemeClr>
+              </a:gs>
+              <a:gs pos="100000">
+                <a:schemeClr val="accent3">
+                  <a:lumMod val="100000"/>
+                </a:schemeClr>
+              </a:gs>
+            </a:gsLst>
+            <a:path path="circle">
+              <a:fillToRect l="100000" t="100000"/>
+            </a:path>
+            <a:tileRect r="-100000" b="-100000"/>
+          </a:gradFill>
+          <a:ln>
+            <a:noFill/>
           </a:ln>
+          <a:scene3d>
+            <a:camera prst="orthographicFront"/>
+            <a:lightRig rig="balanced" dir="t"/>
+          </a:scene3d>
+          <a:sp3d>
+            <a:bevelT w="152400" h="50800" prst="softRound"/>
+          </a:sp3d>
         </p:spPr>
         <p:style>
-          <a:lnRef idx="1">
-            <a:schemeClr val="accent1"/>
+          <a:lnRef idx="2">
+            <a:schemeClr val="accent1">
+              <a:shade val="50000"/>
+            </a:schemeClr>
           </a:lnRef>
-          <a:fillRef idx="0">
+          <a:fillRef idx="1">
             <a:schemeClr val="accent1"/>
           </a:fillRef>
           <a:effectRef idx="0">
             <a:schemeClr val="accent1"/>
           </a:effectRef>
           <a:fontRef idx="minor">
-            <a:schemeClr val="tx1"/>
+            <a:schemeClr val="lt1"/>
           </a:fontRef>
         </p:style>
-      </p:cxnSp>
-      <p:sp>
-        <p:nvSpPr>
-          <p:cNvPr id="2" name="Oval 1"/>
+        <p:txBody>
+          <a:bodyPr rtlCol="0" anchor="ctr"/>
+          <a:lstStyle/>
+          <a:p>
+            <a:pPr algn="ctr"/>
+            <a:endParaRPr lang="en-US" dirty="0"/>
+          </a:p>
+        </p:txBody>
+      </p:sp>
+      <p:sp>
+        <p:nvSpPr>
+          <p:cNvPr id="17" name="Oval 16"/>
           <p:cNvSpPr/>
           <p:nvPr/>
         </p:nvSpPr>
         <p:spPr>
           <a:xfrm>
-            <a:off x="5105400" y="2333625"/>
-            <a:ext cx="192024" cy="192024"/>
+            <a:off x="4283543" y="2944619"/>
+            <a:ext cx="1234440" cy="1234440"/>
           </a:xfrm>
           <a:prstGeom prst="ellipse">
             <a:avLst/>
           </a:prstGeom>
-          <a:noFill/>
-          <a:ln>
-            <a:solidFill>
-              <a:schemeClr val="bg1">
-                <a:lumMod val="85000"/>
-              </a:schemeClr>
-            </a:solidFill>
+          <a:blipFill dpi="0" rotWithShape="1">
+            <a:blip r:embed="rId2"/>
+            <a:srcRect/>
+            <a:stretch>
+              <a:fillRect/>
+            </a:stretch>
+          </a:blipFill>
+          <a:ln w="63500">
+            <a:gradFill flip="none" rotWithShape="1">
+              <a:gsLst>
+                <a:gs pos="0">
+                  <a:schemeClr val="accent2">
+                    <a:lumMod val="67000"/>
+                  </a:schemeClr>
+                </a:gs>
+                <a:gs pos="48000">
+                  <a:schemeClr val="accent2">
+                    <a:lumMod val="97000"/>
+                    <a:lumOff val="3000"/>
+                  </a:schemeClr>
+                </a:gs>
+                <a:gs pos="100000">
+                  <a:schemeClr val="accent2">
+                    <a:lumMod val="60000"/>
+                    <a:lumOff val="40000"/>
+                  </a:schemeClr>
+                </a:gs>
+              </a:gsLst>
+              <a:lin ang="16200000" scaled="1"/>
+              <a:tileRect/>
+            </a:gradFill>
           </a:ln>
         </p:spPr>
         <p:style>
@@ -3395,80 +3194,63 @@
           <a:lstStyle/>
           <a:p>
             <a:pPr algn="ctr"/>
-            <a:endParaRPr lang="en-US"/>
-          </a:p>
-        </p:txBody>
-      </p:sp>
-      <p:sp>
-        <p:nvSpPr>
-          <p:cNvPr id="15" name="Oval 14"/>
-          <p:cNvSpPr/>
-          <p:nvPr/>
-        </p:nvSpPr>
-        <p:spPr>
-          <a:xfrm>
-            <a:off x="5123688" y="2351913"/>
-            <a:ext cx="155448" cy="155448"/>
-          </a:xfrm>
-          <a:prstGeom prst="ellipse">
-            <a:avLst/>
-          </a:prstGeom>
-          <a:solidFill>
-            <a:srgbClr val="CC0000"/>
-          </a:solidFill>
-          <a:ln>
-            <a:noFill/>
-          </a:ln>
-        </p:spPr>
-        <p:style>
-          <a:lnRef idx="2">
-            <a:schemeClr val="accent1">
-              <a:shade val="50000"/>
-            </a:schemeClr>
-          </a:lnRef>
-          <a:fillRef idx="1">
-            <a:schemeClr val="accent1"/>
-          </a:fillRef>
-          <a:effectRef idx="0">
-            <a:schemeClr val="accent1"/>
-          </a:effectRef>
-          <a:fontRef idx="minor">
-            <a:schemeClr val="lt1"/>
-          </a:fontRef>
-        </p:style>
-        <p:txBody>
-          <a:bodyPr rtlCol="0" anchor="ctr"/>
-          <a:lstStyle/>
-          <a:p>
-            <a:pPr algn="ctr"/>
-            <a:endParaRPr lang="en-US"/>
+            <a:endParaRPr lang="en-US" dirty="0"/>
           </a:p>
         </p:txBody>
       </p:sp>
       <p:grpSp>
         <p:nvGrpSpPr>
-          <p:cNvPr id="7" name="Group 6"/>
+          <p:cNvPr id="18" name="Group 17"/>
           <p:cNvGrpSpPr/>
           <p:nvPr/>
         </p:nvGrpSpPr>
         <p:grpSpPr>
           <a:xfrm>
-            <a:off x="2588014" y="3321170"/>
-            <a:ext cx="1639019" cy="1639019"/>
-            <a:chOff x="2588014" y="3321170"/>
-            <a:chExt cx="1639019" cy="1639019"/>
+            <a:off x="5874327" y="2058483"/>
+            <a:ext cx="1557882" cy="1551447"/>
+            <a:chOff x="5874327" y="2058483"/>
+            <a:chExt cx="1557882" cy="1551447"/>
           </a:xfrm>
         </p:grpSpPr>
+        <p:pic>
+          <p:nvPicPr>
+            <p:cNvPr id="6" name="Picture 5"/>
+            <p:cNvPicPr>
+              <a:picLocks noChangeAspect="1"/>
+            </p:cNvPicPr>
+            <p:nvPr/>
+          </p:nvPicPr>
+          <p:blipFill rotWithShape="1">
+            <a:blip r:embed="rId3">
+              <a:extLst>
+                <a:ext uri="{28A0092B-C50C-407E-A947-70E740481C1C}">
+                  <a14:useLocalDpi xmlns:a14="http://schemas.microsoft.com/office/drawing/2010/main" val="0"/>
+                </a:ext>
+              </a:extLst>
+            </a:blip>
+            <a:srcRect l="15587" t="4804" r="16263" b="4706"/>
+            <a:stretch/>
+          </p:blipFill>
+          <p:spPr>
+            <a:xfrm>
+              <a:off x="5874327" y="2058483"/>
+              <a:ext cx="1557882" cy="1551447"/>
+            </a:xfrm>
+            <a:prstGeom prst="rect">
+              <a:avLst/>
+            </a:prstGeom>
+          </p:spPr>
+        </p:pic>
         <p:sp>
           <p:nvSpPr>
-            <p:cNvPr id="3" name="Oval 2"/>
+            <p:cNvPr id="8" name="Oval 7"/>
             <p:cNvSpPr/>
             <p:nvPr/>
           </p:nvSpPr>
           <p:spPr>
             <a:xfrm>
-              <a:off x="2588014" y="3321170"/>
-              <a:ext cx="1639019" cy="1639019"/>
+              <a:off x="6171133" y="2357203"/>
+              <a:ext cx="948059" cy="948059"/>
             </a:xfrm>
             <a:prstGeom prst="ellipse">
               <a:avLst/>
@@ -3476,57 +3258,38 @@
             <a:gradFill flip="none" rotWithShape="1">
               <a:gsLst>
                 <a:gs pos="0">
-                  <a:schemeClr val="accent3">
-                    <a:lumMod val="5000"/>
-                    <a:lumOff val="95000"/>
+                  <a:schemeClr val="accent1">
+                    <a:lumMod val="40000"/>
+                    <a:lumOff val="60000"/>
                   </a:schemeClr>
                 </a:gs>
-                <a:gs pos="74000">
-                  <a:schemeClr val="accent3">
-                    <a:lumMod val="45000"/>
-                    <a:lumOff val="55000"/>
-                  </a:schemeClr>
-                </a:gs>
-                <a:gs pos="83000">
-                  <a:schemeClr val="accent3">
-                    <a:lumMod val="45000"/>
-                    <a:lumOff val="55000"/>
+                <a:gs pos="46000">
+                  <a:schemeClr val="accent1">
+                    <a:lumMod val="95000"/>
+                    <a:lumOff val="5000"/>
                   </a:schemeClr>
                 </a:gs>
                 <a:gs pos="100000">
-                  <a:schemeClr val="accent3">
-                    <a:lumMod val="30000"/>
-                    <a:lumOff val="70000"/>
+                  <a:schemeClr val="accent1">
+                    <a:lumMod val="60000"/>
                   </a:schemeClr>
                 </a:gs>
               </a:gsLst>
               <a:path path="circle">
-                <a:fillToRect l="100000" t="100000"/>
+                <a:fillToRect l="50000" t="130000" r="50000" b="-30000"/>
               </a:path>
-              <a:tileRect r="-100000" b="-100000"/>
+              <a:tileRect/>
             </a:gradFill>
-            <a:ln>
-              <a:noFill/>
-            </a:ln>
-            <a:scene3d>
-              <a:camera prst="orthographicFront"/>
-              <a:lightRig rig="threePt" dir="t"/>
-            </a:scene3d>
-            <a:sp3d>
-              <a:bevelT prst="angle"/>
-            </a:sp3d>
           </p:spPr>
           <p:style>
-            <a:lnRef idx="2">
-              <a:schemeClr val="accent1">
-                <a:shade val="50000"/>
-              </a:schemeClr>
+            <a:lnRef idx="0">
+              <a:schemeClr val="accent3"/>
             </a:lnRef>
-            <a:fillRef idx="1">
-              <a:schemeClr val="accent1"/>
+            <a:fillRef idx="3">
+              <a:schemeClr val="accent3"/>
             </a:fillRef>
-            <a:effectRef idx="0">
-              <a:schemeClr val="accent1"/>
+            <a:effectRef idx="3">
+              <a:schemeClr val="accent3"/>
             </a:effectRef>
             <a:fontRef idx="minor">
               <a:schemeClr val="lt1"/>
@@ -3537,154 +3300,92 @@
             <a:lstStyle/>
             <a:p>
               <a:pPr algn="ctr"/>
-              <a:endParaRPr lang="en-US"/>
+              <a:endParaRPr lang="en-US" b="1">
+                <a:ln w="22225">
+                  <a:solidFill>
+                    <a:schemeClr val="accent2"/>
+                  </a:solidFill>
+                  <a:prstDash val="solid"/>
+                </a:ln>
+                <a:solidFill>
+                  <a:schemeClr val="accent2">
+                    <a:lumMod val="40000"/>
+                    <a:lumOff val="60000"/>
+                  </a:schemeClr>
+                </a:solidFill>
+              </a:endParaRPr>
             </a:p>
           </p:txBody>
         </p:sp>
         <p:sp>
           <p:nvSpPr>
-            <p:cNvPr id="16" name="Oval 15"/>
+            <p:cNvPr id="9" name="Rectangle 8"/>
             <p:cNvSpPr/>
             <p:nvPr/>
           </p:nvSpPr>
           <p:spPr>
             <a:xfrm>
-              <a:off x="2694291" y="3426304"/>
-              <a:ext cx="1426464" cy="1428750"/>
+              <a:off x="6300356" y="2182919"/>
+              <a:ext cx="689612" cy="1200329"/>
             </a:xfrm>
-            <a:prstGeom prst="ellipse">
+            <a:prstGeom prst="rect">
               <a:avLst/>
             </a:prstGeom>
-            <a:gradFill flip="none" rotWithShape="1">
-              <a:gsLst>
-                <a:gs pos="0">
-                  <a:schemeClr val="accent3">
-                    <a:lumMod val="0"/>
-                    <a:lumOff val="100000"/>
-                  </a:schemeClr>
-                </a:gs>
-                <a:gs pos="35000">
-                  <a:schemeClr val="accent3">
-                    <a:lumMod val="0"/>
-                    <a:lumOff val="100000"/>
-                  </a:schemeClr>
-                </a:gs>
-                <a:gs pos="100000">
-                  <a:schemeClr val="accent3">
-                    <a:lumMod val="100000"/>
-                  </a:schemeClr>
-                </a:gs>
-              </a:gsLst>
-              <a:path path="circle">
-                <a:fillToRect l="100000" t="100000"/>
-              </a:path>
-              <a:tileRect r="-100000" b="-100000"/>
-            </a:gradFill>
-            <a:ln>
-              <a:noFill/>
-            </a:ln>
-            <a:scene3d>
-              <a:camera prst="orthographicFront"/>
-              <a:lightRig rig="balanced" dir="t"/>
-            </a:scene3d>
-            <a:sp3d>
-              <a:bevelT w="152400" h="50800" prst="softRound"/>
-            </a:sp3d>
+            <a:noFill/>
           </p:spPr>
-          <p:style>
-            <a:lnRef idx="2">
-              <a:schemeClr val="accent1">
-                <a:shade val="50000"/>
-              </a:schemeClr>
-            </a:lnRef>
-            <a:fillRef idx="1">
-              <a:schemeClr val="accent1"/>
-            </a:fillRef>
-            <a:effectRef idx="0">
-              <a:schemeClr val="accent1"/>
-            </a:effectRef>
-            <a:fontRef idx="minor">
-              <a:schemeClr val="lt1"/>
-            </a:fontRef>
-          </p:style>
           <p:txBody>
-            <a:bodyPr rtlCol="0" anchor="ctr"/>
+            <a:bodyPr wrap="none" lIns="91440" tIns="45720" rIns="91440" bIns="45720">
+              <a:spAutoFit/>
+            </a:bodyPr>
             <a:lstStyle/>
             <a:p>
               <a:pPr algn="ctr"/>
-              <a:endParaRPr lang="en-US" dirty="0"/>
-            </a:p>
-          </p:txBody>
-        </p:sp>
-        <p:sp>
-          <p:nvSpPr>
-            <p:cNvPr id="17" name="Oval 16"/>
-            <p:cNvSpPr/>
-            <p:nvPr/>
-          </p:nvSpPr>
-          <p:spPr>
-            <a:xfrm>
-              <a:off x="2790303" y="3523459"/>
-              <a:ext cx="1234440" cy="1234440"/>
-            </a:xfrm>
-            <a:prstGeom prst="ellipse">
-              <a:avLst/>
-            </a:prstGeom>
-            <a:blipFill dpi="0" rotWithShape="1">
-              <a:blip r:embed="rId2"/>
-              <a:srcRect/>
-              <a:stretch>
-                <a:fillRect/>
-              </a:stretch>
-            </a:blipFill>
-            <a:ln w="63500">
-              <a:gradFill flip="none" rotWithShape="1">
-                <a:gsLst>
-                  <a:gs pos="0">
-                    <a:schemeClr val="accent2">
-                      <a:lumMod val="67000"/>
-                    </a:schemeClr>
-                  </a:gs>
-                  <a:gs pos="48000">
-                    <a:schemeClr val="accent2">
-                      <a:lumMod val="97000"/>
-                      <a:lumOff val="3000"/>
-                    </a:schemeClr>
-                  </a:gs>
-                  <a:gs pos="100000">
-                    <a:schemeClr val="accent2">
-                      <a:lumMod val="60000"/>
-                      <a:lumOff val="40000"/>
-                    </a:schemeClr>
-                  </a:gs>
-                </a:gsLst>
-                <a:lin ang="16200000" scaled="1"/>
-                <a:tileRect/>
-              </a:gradFill>
-            </a:ln>
-          </p:spPr>
-          <p:style>
-            <a:lnRef idx="2">
-              <a:schemeClr val="accent1">
-                <a:shade val="50000"/>
-              </a:schemeClr>
-            </a:lnRef>
-            <a:fillRef idx="1">
-              <a:schemeClr val="accent1"/>
-            </a:fillRef>
-            <a:effectRef idx="0">
-              <a:schemeClr val="accent1"/>
-            </a:effectRef>
-            <a:fontRef idx="minor">
-              <a:schemeClr val="lt1"/>
-            </a:fontRef>
-          </p:style>
-          <p:txBody>
-            <a:bodyPr rtlCol="0" anchor="ctr"/>
-            <a:lstStyle/>
-            <a:p>
-              <a:pPr algn="ctr"/>
-              <a:endParaRPr lang="en-US" dirty="0"/>
+              <a:r>
+                <a:rPr lang="en-US" sz="7200" b="1" dirty="0" smtClean="0">
+                  <a:ln w="10160">
+                    <a:solidFill>
+                      <a:schemeClr val="accent5"/>
+                    </a:solidFill>
+                    <a:prstDash val="solid"/>
+                  </a:ln>
+                  <a:solidFill>
+                    <a:srgbClr val="FFFFFF"/>
+                  </a:solidFill>
+                  <a:effectLst>
+                    <a:outerShdw blurRad="38100" dist="22860" dir="5400000" algn="tl" rotWithShape="0">
+                      <a:srgbClr val="000000">
+                        <a:alpha val="30000"/>
+                      </a:srgbClr>
+                    </a:outerShdw>
+                  </a:effectLst>
+                </a:rPr>
+                <a:t>K</a:t>
+              </a:r>
+              <a:endParaRPr lang="en-US" sz="7200" b="0" cap="none" spc="0" dirty="0">
+                <a:ln w="0"/>
+                <a:gradFill>
+                  <a:gsLst>
+                    <a:gs pos="0">
+                      <a:schemeClr val="accent5">
+                        <a:lumMod val="50000"/>
+                      </a:schemeClr>
+                    </a:gs>
+                    <a:gs pos="50000">
+                      <a:schemeClr val="accent5"/>
+                    </a:gs>
+                    <a:gs pos="100000">
+                      <a:schemeClr val="accent5">
+                        <a:lumMod val="60000"/>
+                        <a:lumOff val="40000"/>
+                      </a:schemeClr>
+                    </a:gs>
+                  </a:gsLst>
+                  <a:lin ang="5400000"/>
+                </a:gradFill>
+                <a:effectLst>
+                  <a:reflection blurRad="6350" stA="53000" endA="300" endPos="35500" dir="5400000" sy="-90000" algn="bl" rotWithShape="0"/>
+                </a:effectLst>
+              </a:endParaRPr>
             </a:p>
           </p:txBody>
         </p:sp>

</xml_diff>

<commit_message>
# 8/20/19 Changelog # Updated Polarion table context menu # Added Pause with step number feature # Added option for selecting print output
</commit_message>
<xml_diff>
--- a/design/graphics.pptx
+++ b/design/graphics.pptx
@@ -154,10 +154,9 @@
           </a:lstStyle>
           <a:p>
             <a:r>
-              <a:rPr lang="en-US" smtClean="0"/>
+              <a:rPr lang="en-US"/>
               <a:t>Click to edit Master title style</a:t>
             </a:r>
-            <a:endParaRPr lang="en-US"/>
           </a:p>
         </p:txBody>
       </p:sp>
@@ -219,10 +218,9 @@
           </a:lstStyle>
           <a:p>
             <a:r>
-              <a:rPr lang="en-US" smtClean="0"/>
+              <a:rPr lang="en-US"/>
               <a:t>Click to edit Master subtitle style</a:t>
             </a:r>
-            <a:endParaRPr lang="en-US"/>
           </a:p>
         </p:txBody>
       </p:sp>
@@ -243,7 +241,7 @@
           <a:p>
             <a:fld id="{CC3BE8E3-77CC-4B13-A1CD-E42BB7833108}" type="datetimeFigureOut">
               <a:rPr lang="en-US" smtClean="0"/>
-              <a:t>5/15/2019</a:t>
+              <a:t>7/26/2019</a:t>
             </a:fld>
             <a:endParaRPr lang="en-US"/>
           </a:p>
@@ -337,10 +335,9 @@
           <a:lstStyle/>
           <a:p>
             <a:r>
-              <a:rPr lang="en-US" smtClean="0"/>
+              <a:rPr lang="en-US"/>
               <a:t>Click to edit Master title style</a:t>
             </a:r>
-            <a:endParaRPr lang="en-US"/>
           </a:p>
         </p:txBody>
       </p:sp>
@@ -361,38 +358,37 @@
           <a:p>
             <a:pPr lvl="0"/>
             <a:r>
-              <a:rPr lang="en-US" smtClean="0"/>
+              <a:rPr lang="en-US"/>
               <a:t>Click to edit Master text styles</a:t>
             </a:r>
           </a:p>
           <a:p>
             <a:pPr lvl="1"/>
             <a:r>
-              <a:rPr lang="en-US" smtClean="0"/>
+              <a:rPr lang="en-US"/>
               <a:t>Second level</a:t>
             </a:r>
           </a:p>
           <a:p>
             <a:pPr lvl="2"/>
             <a:r>
-              <a:rPr lang="en-US" smtClean="0"/>
+              <a:rPr lang="en-US"/>
               <a:t>Third level</a:t>
             </a:r>
           </a:p>
           <a:p>
             <a:pPr lvl="3"/>
             <a:r>
-              <a:rPr lang="en-US" smtClean="0"/>
+              <a:rPr lang="en-US"/>
               <a:t>Fourth level</a:t>
             </a:r>
           </a:p>
           <a:p>
             <a:pPr lvl="4"/>
             <a:r>
-              <a:rPr lang="en-US" smtClean="0"/>
+              <a:rPr lang="en-US"/>
               <a:t>Fifth level</a:t>
             </a:r>
-            <a:endParaRPr lang="en-US"/>
           </a:p>
         </p:txBody>
       </p:sp>
@@ -413,7 +409,7 @@
           <a:p>
             <a:fld id="{CC3BE8E3-77CC-4B13-A1CD-E42BB7833108}" type="datetimeFigureOut">
               <a:rPr lang="en-US" smtClean="0"/>
-              <a:t>5/15/2019</a:t>
+              <a:t>7/26/2019</a:t>
             </a:fld>
             <a:endParaRPr lang="en-US"/>
           </a:p>
@@ -512,10 +508,9 @@
           <a:lstStyle/>
           <a:p>
             <a:r>
-              <a:rPr lang="en-US" smtClean="0"/>
+              <a:rPr lang="en-US"/>
               <a:t>Click to edit Master title style</a:t>
             </a:r>
-            <a:endParaRPr lang="en-US"/>
           </a:p>
         </p:txBody>
       </p:sp>
@@ -541,38 +536,37 @@
           <a:p>
             <a:pPr lvl="0"/>
             <a:r>
-              <a:rPr lang="en-US" smtClean="0"/>
+              <a:rPr lang="en-US"/>
               <a:t>Click to edit Master text styles</a:t>
             </a:r>
           </a:p>
           <a:p>
             <a:pPr lvl="1"/>
             <a:r>
-              <a:rPr lang="en-US" smtClean="0"/>
+              <a:rPr lang="en-US"/>
               <a:t>Second level</a:t>
             </a:r>
           </a:p>
           <a:p>
             <a:pPr lvl="2"/>
             <a:r>
-              <a:rPr lang="en-US" smtClean="0"/>
+              <a:rPr lang="en-US"/>
               <a:t>Third level</a:t>
             </a:r>
           </a:p>
           <a:p>
             <a:pPr lvl="3"/>
             <a:r>
-              <a:rPr lang="en-US" smtClean="0"/>
+              <a:rPr lang="en-US"/>
               <a:t>Fourth level</a:t>
             </a:r>
           </a:p>
           <a:p>
             <a:pPr lvl="4"/>
             <a:r>
-              <a:rPr lang="en-US" smtClean="0"/>
+              <a:rPr lang="en-US"/>
               <a:t>Fifth level</a:t>
             </a:r>
-            <a:endParaRPr lang="en-US"/>
           </a:p>
         </p:txBody>
       </p:sp>
@@ -593,7 +587,7 @@
           <a:p>
             <a:fld id="{CC3BE8E3-77CC-4B13-A1CD-E42BB7833108}" type="datetimeFigureOut">
               <a:rPr lang="en-US" smtClean="0"/>
-              <a:t>5/15/2019</a:t>
+              <a:t>7/26/2019</a:t>
             </a:fld>
             <a:endParaRPr lang="en-US"/>
           </a:p>
@@ -687,10 +681,9 @@
           <a:lstStyle/>
           <a:p>
             <a:r>
-              <a:rPr lang="en-US" smtClean="0"/>
+              <a:rPr lang="en-US"/>
               <a:t>Click to edit Master title style</a:t>
             </a:r>
-            <a:endParaRPr lang="en-US"/>
           </a:p>
         </p:txBody>
       </p:sp>
@@ -711,38 +704,37 @@
           <a:p>
             <a:pPr lvl="0"/>
             <a:r>
-              <a:rPr lang="en-US" smtClean="0"/>
+              <a:rPr lang="en-US"/>
               <a:t>Click to edit Master text styles</a:t>
             </a:r>
           </a:p>
           <a:p>
             <a:pPr lvl="1"/>
             <a:r>
-              <a:rPr lang="en-US" smtClean="0"/>
+              <a:rPr lang="en-US"/>
               <a:t>Second level</a:t>
             </a:r>
           </a:p>
           <a:p>
             <a:pPr lvl="2"/>
             <a:r>
-              <a:rPr lang="en-US" smtClean="0"/>
+              <a:rPr lang="en-US"/>
               <a:t>Third level</a:t>
             </a:r>
           </a:p>
           <a:p>
             <a:pPr lvl="3"/>
             <a:r>
-              <a:rPr lang="en-US" smtClean="0"/>
+              <a:rPr lang="en-US"/>
               <a:t>Fourth level</a:t>
             </a:r>
           </a:p>
           <a:p>
             <a:pPr lvl="4"/>
             <a:r>
-              <a:rPr lang="en-US" smtClean="0"/>
+              <a:rPr lang="en-US"/>
               <a:t>Fifth level</a:t>
             </a:r>
-            <a:endParaRPr lang="en-US"/>
           </a:p>
         </p:txBody>
       </p:sp>
@@ -763,7 +755,7 @@
           <a:p>
             <a:fld id="{CC3BE8E3-77CC-4B13-A1CD-E42BB7833108}" type="datetimeFigureOut">
               <a:rPr lang="en-US" smtClean="0"/>
-              <a:t>5/15/2019</a:t>
+              <a:t>7/26/2019</a:t>
             </a:fld>
             <a:endParaRPr lang="en-US"/>
           </a:p>
@@ -866,10 +858,9 @@
           </a:lstStyle>
           <a:p>
             <a:r>
-              <a:rPr lang="en-US" smtClean="0"/>
+              <a:rPr lang="en-US"/>
               <a:t>Click to edit Master title style</a:t>
             </a:r>
-            <a:endParaRPr lang="en-US"/>
           </a:p>
         </p:txBody>
       </p:sp>
@@ -986,7 +977,7 @@
           <a:p>
             <a:pPr lvl="0"/>
             <a:r>
-              <a:rPr lang="en-US" smtClean="0"/>
+              <a:rPr lang="en-US"/>
               <a:t>Click to edit Master text styles</a:t>
             </a:r>
           </a:p>
@@ -1009,7 +1000,7 @@
           <a:p>
             <a:fld id="{CC3BE8E3-77CC-4B13-A1CD-E42BB7833108}" type="datetimeFigureOut">
               <a:rPr lang="en-US" smtClean="0"/>
-              <a:t>5/15/2019</a:t>
+              <a:t>7/26/2019</a:t>
             </a:fld>
             <a:endParaRPr lang="en-US"/>
           </a:p>
@@ -1103,10 +1094,9 @@
           <a:lstStyle/>
           <a:p>
             <a:r>
-              <a:rPr lang="en-US" smtClean="0"/>
+              <a:rPr lang="en-US"/>
               <a:t>Click to edit Master title style</a:t>
             </a:r>
-            <a:endParaRPr lang="en-US"/>
           </a:p>
         </p:txBody>
       </p:sp>
@@ -1132,38 +1122,37 @@
           <a:p>
             <a:pPr lvl="0"/>
             <a:r>
-              <a:rPr lang="en-US" smtClean="0"/>
+              <a:rPr lang="en-US"/>
               <a:t>Click to edit Master text styles</a:t>
             </a:r>
           </a:p>
           <a:p>
             <a:pPr lvl="1"/>
             <a:r>
-              <a:rPr lang="en-US" smtClean="0"/>
+              <a:rPr lang="en-US"/>
               <a:t>Second level</a:t>
             </a:r>
           </a:p>
           <a:p>
             <a:pPr lvl="2"/>
             <a:r>
-              <a:rPr lang="en-US" smtClean="0"/>
+              <a:rPr lang="en-US"/>
               <a:t>Third level</a:t>
             </a:r>
           </a:p>
           <a:p>
             <a:pPr lvl="3"/>
             <a:r>
-              <a:rPr lang="en-US" smtClean="0"/>
+              <a:rPr lang="en-US"/>
               <a:t>Fourth level</a:t>
             </a:r>
           </a:p>
           <a:p>
             <a:pPr lvl="4"/>
             <a:r>
-              <a:rPr lang="en-US" smtClean="0"/>
+              <a:rPr lang="en-US"/>
               <a:t>Fifth level</a:t>
             </a:r>
-            <a:endParaRPr lang="en-US"/>
           </a:p>
         </p:txBody>
       </p:sp>
@@ -1189,38 +1178,37 @@
           <a:p>
             <a:pPr lvl="0"/>
             <a:r>
-              <a:rPr lang="en-US" smtClean="0"/>
+              <a:rPr lang="en-US"/>
               <a:t>Click to edit Master text styles</a:t>
             </a:r>
           </a:p>
           <a:p>
             <a:pPr lvl="1"/>
             <a:r>
-              <a:rPr lang="en-US" smtClean="0"/>
+              <a:rPr lang="en-US"/>
               <a:t>Second level</a:t>
             </a:r>
           </a:p>
           <a:p>
             <a:pPr lvl="2"/>
             <a:r>
-              <a:rPr lang="en-US" smtClean="0"/>
+              <a:rPr lang="en-US"/>
               <a:t>Third level</a:t>
             </a:r>
           </a:p>
           <a:p>
             <a:pPr lvl="3"/>
             <a:r>
-              <a:rPr lang="en-US" smtClean="0"/>
+              <a:rPr lang="en-US"/>
               <a:t>Fourth level</a:t>
             </a:r>
           </a:p>
           <a:p>
             <a:pPr lvl="4"/>
             <a:r>
-              <a:rPr lang="en-US" smtClean="0"/>
+              <a:rPr lang="en-US"/>
               <a:t>Fifth level</a:t>
             </a:r>
-            <a:endParaRPr lang="en-US"/>
           </a:p>
         </p:txBody>
       </p:sp>
@@ -1241,7 +1229,7 @@
           <a:p>
             <a:fld id="{CC3BE8E3-77CC-4B13-A1CD-E42BB7833108}" type="datetimeFigureOut">
               <a:rPr lang="en-US" smtClean="0"/>
-              <a:t>5/15/2019</a:t>
+              <a:t>7/26/2019</a:t>
             </a:fld>
             <a:endParaRPr lang="en-US"/>
           </a:p>
@@ -1340,10 +1328,9 @@
           <a:lstStyle/>
           <a:p>
             <a:r>
-              <a:rPr lang="en-US" smtClean="0"/>
+              <a:rPr lang="en-US"/>
               <a:t>Click to edit Master title style</a:t>
             </a:r>
-            <a:endParaRPr lang="en-US"/>
           </a:p>
         </p:txBody>
       </p:sp>
@@ -1406,7 +1393,7 @@
           <a:p>
             <a:pPr lvl="0"/>
             <a:r>
-              <a:rPr lang="en-US" smtClean="0"/>
+              <a:rPr lang="en-US"/>
               <a:t>Click to edit Master text styles</a:t>
             </a:r>
           </a:p>
@@ -1434,38 +1421,37 @@
           <a:p>
             <a:pPr lvl="0"/>
             <a:r>
-              <a:rPr lang="en-US" smtClean="0"/>
+              <a:rPr lang="en-US"/>
               <a:t>Click to edit Master text styles</a:t>
             </a:r>
           </a:p>
           <a:p>
             <a:pPr lvl="1"/>
             <a:r>
-              <a:rPr lang="en-US" smtClean="0"/>
+              <a:rPr lang="en-US"/>
               <a:t>Second level</a:t>
             </a:r>
           </a:p>
           <a:p>
             <a:pPr lvl="2"/>
             <a:r>
-              <a:rPr lang="en-US" smtClean="0"/>
+              <a:rPr lang="en-US"/>
               <a:t>Third level</a:t>
             </a:r>
           </a:p>
           <a:p>
             <a:pPr lvl="3"/>
             <a:r>
-              <a:rPr lang="en-US" smtClean="0"/>
+              <a:rPr lang="en-US"/>
               <a:t>Fourth level</a:t>
             </a:r>
           </a:p>
           <a:p>
             <a:pPr lvl="4"/>
             <a:r>
-              <a:rPr lang="en-US" smtClean="0"/>
+              <a:rPr lang="en-US"/>
               <a:t>Fifth level</a:t>
             </a:r>
-            <a:endParaRPr lang="en-US"/>
           </a:p>
         </p:txBody>
       </p:sp>
@@ -1528,7 +1514,7 @@
           <a:p>
             <a:pPr lvl="0"/>
             <a:r>
-              <a:rPr lang="en-US" smtClean="0"/>
+              <a:rPr lang="en-US"/>
               <a:t>Click to edit Master text styles</a:t>
             </a:r>
           </a:p>
@@ -1556,38 +1542,37 @@
           <a:p>
             <a:pPr lvl="0"/>
             <a:r>
-              <a:rPr lang="en-US" smtClean="0"/>
+              <a:rPr lang="en-US"/>
               <a:t>Click to edit Master text styles</a:t>
             </a:r>
           </a:p>
           <a:p>
             <a:pPr lvl="1"/>
             <a:r>
-              <a:rPr lang="en-US" smtClean="0"/>
+              <a:rPr lang="en-US"/>
               <a:t>Second level</a:t>
             </a:r>
           </a:p>
           <a:p>
             <a:pPr lvl="2"/>
             <a:r>
-              <a:rPr lang="en-US" smtClean="0"/>
+              <a:rPr lang="en-US"/>
               <a:t>Third level</a:t>
             </a:r>
           </a:p>
           <a:p>
             <a:pPr lvl="3"/>
             <a:r>
-              <a:rPr lang="en-US" smtClean="0"/>
+              <a:rPr lang="en-US"/>
               <a:t>Fourth level</a:t>
             </a:r>
           </a:p>
           <a:p>
             <a:pPr lvl="4"/>
             <a:r>
-              <a:rPr lang="en-US" smtClean="0"/>
+              <a:rPr lang="en-US"/>
               <a:t>Fifth level</a:t>
             </a:r>
-            <a:endParaRPr lang="en-US"/>
           </a:p>
         </p:txBody>
       </p:sp>
@@ -1608,7 +1593,7 @@
           <a:p>
             <a:fld id="{CC3BE8E3-77CC-4B13-A1CD-E42BB7833108}" type="datetimeFigureOut">
               <a:rPr lang="en-US" smtClean="0"/>
-              <a:t>5/15/2019</a:t>
+              <a:t>7/26/2019</a:t>
             </a:fld>
             <a:endParaRPr lang="en-US"/>
           </a:p>
@@ -1702,10 +1687,9 @@
           <a:lstStyle/>
           <a:p>
             <a:r>
-              <a:rPr lang="en-US" smtClean="0"/>
+              <a:rPr lang="en-US"/>
               <a:t>Click to edit Master title style</a:t>
             </a:r>
-            <a:endParaRPr lang="en-US"/>
           </a:p>
         </p:txBody>
       </p:sp>
@@ -1726,7 +1710,7 @@
           <a:p>
             <a:fld id="{CC3BE8E3-77CC-4B13-A1CD-E42BB7833108}" type="datetimeFigureOut">
               <a:rPr lang="en-US" smtClean="0"/>
-              <a:t>5/15/2019</a:t>
+              <a:t>7/26/2019</a:t>
             </a:fld>
             <a:endParaRPr lang="en-US"/>
           </a:p>
@@ -1821,7 +1805,7 @@
           <a:p>
             <a:fld id="{CC3BE8E3-77CC-4B13-A1CD-E42BB7833108}" type="datetimeFigureOut">
               <a:rPr lang="en-US" smtClean="0"/>
-              <a:t>5/15/2019</a:t>
+              <a:t>7/26/2019</a:t>
             </a:fld>
             <a:endParaRPr lang="en-US"/>
           </a:p>
@@ -1924,10 +1908,9 @@
           </a:lstStyle>
           <a:p>
             <a:r>
-              <a:rPr lang="en-US" smtClean="0"/>
+              <a:rPr lang="en-US"/>
               <a:t>Click to edit Master title style</a:t>
             </a:r>
-            <a:endParaRPr lang="en-US"/>
           </a:p>
         </p:txBody>
       </p:sp>
@@ -1981,38 +1964,37 @@
           <a:p>
             <a:pPr lvl="0"/>
             <a:r>
-              <a:rPr lang="en-US" smtClean="0"/>
+              <a:rPr lang="en-US"/>
               <a:t>Click to edit Master text styles</a:t>
             </a:r>
           </a:p>
           <a:p>
             <a:pPr lvl="1"/>
             <a:r>
-              <a:rPr lang="en-US" smtClean="0"/>
+              <a:rPr lang="en-US"/>
               <a:t>Second level</a:t>
             </a:r>
           </a:p>
           <a:p>
             <a:pPr lvl="2"/>
             <a:r>
-              <a:rPr lang="en-US" smtClean="0"/>
+              <a:rPr lang="en-US"/>
               <a:t>Third level</a:t>
             </a:r>
           </a:p>
           <a:p>
             <a:pPr lvl="3"/>
             <a:r>
-              <a:rPr lang="en-US" smtClean="0"/>
+              <a:rPr lang="en-US"/>
               <a:t>Fourth level</a:t>
             </a:r>
           </a:p>
           <a:p>
             <a:pPr lvl="4"/>
             <a:r>
-              <a:rPr lang="en-US" smtClean="0"/>
+              <a:rPr lang="en-US"/>
               <a:t>Fifth level</a:t>
             </a:r>
-            <a:endParaRPr lang="en-US"/>
           </a:p>
         </p:txBody>
       </p:sp>
@@ -2075,7 +2057,7 @@
           <a:p>
             <a:pPr lvl="0"/>
             <a:r>
-              <a:rPr lang="en-US" smtClean="0"/>
+              <a:rPr lang="en-US"/>
               <a:t>Click to edit Master text styles</a:t>
             </a:r>
           </a:p>
@@ -2098,7 +2080,7 @@
           <a:p>
             <a:fld id="{CC3BE8E3-77CC-4B13-A1CD-E42BB7833108}" type="datetimeFigureOut">
               <a:rPr lang="en-US" smtClean="0"/>
-              <a:t>5/15/2019</a:t>
+              <a:t>7/26/2019</a:t>
             </a:fld>
             <a:endParaRPr lang="en-US"/>
           </a:p>
@@ -2201,10 +2183,9 @@
           </a:lstStyle>
           <a:p>
             <a:r>
-              <a:rPr lang="en-US" smtClean="0"/>
+              <a:rPr lang="en-US"/>
               <a:t>Click to edit Master title style</a:t>
             </a:r>
-            <a:endParaRPr lang="en-US"/>
           </a:p>
         </p:txBody>
       </p:sp>
@@ -2328,7 +2309,7 @@
           <a:p>
             <a:pPr lvl="0"/>
             <a:r>
-              <a:rPr lang="en-US" smtClean="0"/>
+              <a:rPr lang="en-US"/>
               <a:t>Click to edit Master text styles</a:t>
             </a:r>
           </a:p>
@@ -2351,7 +2332,7 @@
           <a:p>
             <a:fld id="{CC3BE8E3-77CC-4B13-A1CD-E42BB7833108}" type="datetimeFigureOut">
               <a:rPr lang="en-US" smtClean="0"/>
-              <a:t>5/15/2019</a:t>
+              <a:t>7/26/2019</a:t>
             </a:fld>
             <a:endParaRPr lang="en-US"/>
           </a:p>
@@ -2460,10 +2441,9 @@
           <a:lstStyle/>
           <a:p>
             <a:r>
-              <a:rPr lang="en-US" smtClean="0"/>
+              <a:rPr lang="en-US"/>
               <a:t>Click to edit Master title style</a:t>
             </a:r>
-            <a:endParaRPr lang="en-US"/>
           </a:p>
         </p:txBody>
       </p:sp>
@@ -2494,38 +2474,37 @@
           <a:p>
             <a:pPr lvl="0"/>
             <a:r>
-              <a:rPr lang="en-US" smtClean="0"/>
+              <a:rPr lang="en-US"/>
               <a:t>Click to edit Master text styles</a:t>
             </a:r>
           </a:p>
           <a:p>
             <a:pPr lvl="1"/>
             <a:r>
-              <a:rPr lang="en-US" smtClean="0"/>
+              <a:rPr lang="en-US"/>
               <a:t>Second level</a:t>
             </a:r>
           </a:p>
           <a:p>
             <a:pPr lvl="2"/>
             <a:r>
-              <a:rPr lang="en-US" smtClean="0"/>
+              <a:rPr lang="en-US"/>
               <a:t>Third level</a:t>
             </a:r>
           </a:p>
           <a:p>
             <a:pPr lvl="3"/>
             <a:r>
-              <a:rPr lang="en-US" smtClean="0"/>
+              <a:rPr lang="en-US"/>
               <a:t>Fourth level</a:t>
             </a:r>
           </a:p>
           <a:p>
             <a:pPr lvl="4"/>
             <a:r>
-              <a:rPr lang="en-US" smtClean="0"/>
+              <a:rPr lang="en-US"/>
               <a:t>Fifth level</a:t>
             </a:r>
-            <a:endParaRPr lang="en-US"/>
           </a:p>
         </p:txBody>
       </p:sp>
@@ -2564,7 +2543,7 @@
           <a:p>
             <a:fld id="{CC3BE8E3-77CC-4B13-A1CD-E42BB7833108}" type="datetimeFigureOut">
               <a:rPr lang="en-US" smtClean="0"/>
-              <a:t>5/15/2019</a:t>
+              <a:t>7/26/2019</a:t>
             </a:fld>
             <a:endParaRPr lang="en-US"/>
           </a:p>
@@ -2969,235 +2948,6 @@
           <a:chExt cx="0" cy="0"/>
         </a:xfrm>
       </p:grpSpPr>
-      <p:sp>
-        <p:nvSpPr>
-          <p:cNvPr id="3" name="Oval 2"/>
-          <p:cNvSpPr/>
-          <p:nvPr/>
-        </p:nvSpPr>
-        <p:spPr>
-          <a:xfrm>
-            <a:off x="4081254" y="2742330"/>
-            <a:ext cx="1639019" cy="1639019"/>
-          </a:xfrm>
-          <a:prstGeom prst="ellipse">
-            <a:avLst/>
-          </a:prstGeom>
-          <a:gradFill flip="none" rotWithShape="1">
-            <a:gsLst>
-              <a:gs pos="0">
-                <a:schemeClr val="accent3">
-                  <a:lumMod val="5000"/>
-                  <a:lumOff val="95000"/>
-                </a:schemeClr>
-              </a:gs>
-              <a:gs pos="74000">
-                <a:schemeClr val="accent3">
-                  <a:lumMod val="45000"/>
-                  <a:lumOff val="55000"/>
-                </a:schemeClr>
-              </a:gs>
-              <a:gs pos="83000">
-                <a:schemeClr val="accent3">
-                  <a:lumMod val="45000"/>
-                  <a:lumOff val="55000"/>
-                </a:schemeClr>
-              </a:gs>
-              <a:gs pos="100000">
-                <a:schemeClr val="accent3">
-                  <a:lumMod val="30000"/>
-                  <a:lumOff val="70000"/>
-                </a:schemeClr>
-              </a:gs>
-            </a:gsLst>
-            <a:path path="circle">
-              <a:fillToRect l="100000" t="100000"/>
-            </a:path>
-            <a:tileRect r="-100000" b="-100000"/>
-          </a:gradFill>
-          <a:ln>
-            <a:noFill/>
-          </a:ln>
-          <a:scene3d>
-            <a:camera prst="orthographicFront"/>
-            <a:lightRig rig="threePt" dir="t"/>
-          </a:scene3d>
-          <a:sp3d>
-            <a:bevelT prst="angle"/>
-          </a:sp3d>
-        </p:spPr>
-        <p:style>
-          <a:lnRef idx="2">
-            <a:schemeClr val="accent1">
-              <a:shade val="50000"/>
-            </a:schemeClr>
-          </a:lnRef>
-          <a:fillRef idx="1">
-            <a:schemeClr val="accent1"/>
-          </a:fillRef>
-          <a:effectRef idx="0">
-            <a:schemeClr val="accent1"/>
-          </a:effectRef>
-          <a:fontRef idx="minor">
-            <a:schemeClr val="lt1"/>
-          </a:fontRef>
-        </p:style>
-        <p:txBody>
-          <a:bodyPr rtlCol="0" anchor="ctr"/>
-          <a:lstStyle/>
-          <a:p>
-            <a:pPr algn="ctr"/>
-            <a:endParaRPr lang="en-US"/>
-          </a:p>
-        </p:txBody>
-      </p:sp>
-      <p:sp>
-        <p:nvSpPr>
-          <p:cNvPr id="16" name="Oval 15"/>
-          <p:cNvSpPr/>
-          <p:nvPr/>
-        </p:nvSpPr>
-        <p:spPr>
-          <a:xfrm>
-            <a:off x="4187531" y="2847464"/>
-            <a:ext cx="1426464" cy="1428750"/>
-          </a:xfrm>
-          <a:prstGeom prst="ellipse">
-            <a:avLst/>
-          </a:prstGeom>
-          <a:gradFill flip="none" rotWithShape="1">
-            <a:gsLst>
-              <a:gs pos="0">
-                <a:schemeClr val="accent3">
-                  <a:lumMod val="0"/>
-                  <a:lumOff val="100000"/>
-                </a:schemeClr>
-              </a:gs>
-              <a:gs pos="35000">
-                <a:schemeClr val="accent3">
-                  <a:lumMod val="0"/>
-                  <a:lumOff val="100000"/>
-                </a:schemeClr>
-              </a:gs>
-              <a:gs pos="100000">
-                <a:schemeClr val="accent3">
-                  <a:lumMod val="100000"/>
-                </a:schemeClr>
-              </a:gs>
-            </a:gsLst>
-            <a:path path="circle">
-              <a:fillToRect l="100000" t="100000"/>
-            </a:path>
-            <a:tileRect r="-100000" b="-100000"/>
-          </a:gradFill>
-          <a:ln>
-            <a:noFill/>
-          </a:ln>
-          <a:scene3d>
-            <a:camera prst="orthographicFront"/>
-            <a:lightRig rig="balanced" dir="t"/>
-          </a:scene3d>
-          <a:sp3d>
-            <a:bevelT w="152400" h="50800" prst="softRound"/>
-          </a:sp3d>
-        </p:spPr>
-        <p:style>
-          <a:lnRef idx="2">
-            <a:schemeClr val="accent1">
-              <a:shade val="50000"/>
-            </a:schemeClr>
-          </a:lnRef>
-          <a:fillRef idx="1">
-            <a:schemeClr val="accent1"/>
-          </a:fillRef>
-          <a:effectRef idx="0">
-            <a:schemeClr val="accent1"/>
-          </a:effectRef>
-          <a:fontRef idx="minor">
-            <a:schemeClr val="lt1"/>
-          </a:fontRef>
-        </p:style>
-        <p:txBody>
-          <a:bodyPr rtlCol="0" anchor="ctr"/>
-          <a:lstStyle/>
-          <a:p>
-            <a:pPr algn="ctr"/>
-            <a:endParaRPr lang="en-US" dirty="0"/>
-          </a:p>
-        </p:txBody>
-      </p:sp>
-      <p:sp>
-        <p:nvSpPr>
-          <p:cNvPr id="17" name="Oval 16"/>
-          <p:cNvSpPr/>
-          <p:nvPr/>
-        </p:nvSpPr>
-        <p:spPr>
-          <a:xfrm>
-            <a:off x="4283543" y="2944619"/>
-            <a:ext cx="1234440" cy="1234440"/>
-          </a:xfrm>
-          <a:prstGeom prst="ellipse">
-            <a:avLst/>
-          </a:prstGeom>
-          <a:blipFill dpi="0" rotWithShape="1">
-            <a:blip r:embed="rId2"/>
-            <a:srcRect/>
-            <a:stretch>
-              <a:fillRect/>
-            </a:stretch>
-          </a:blipFill>
-          <a:ln w="63500">
-            <a:gradFill flip="none" rotWithShape="1">
-              <a:gsLst>
-                <a:gs pos="0">
-                  <a:schemeClr val="accent2">
-                    <a:lumMod val="67000"/>
-                  </a:schemeClr>
-                </a:gs>
-                <a:gs pos="48000">
-                  <a:schemeClr val="accent2">
-                    <a:lumMod val="97000"/>
-                    <a:lumOff val="3000"/>
-                  </a:schemeClr>
-                </a:gs>
-                <a:gs pos="100000">
-                  <a:schemeClr val="accent2">
-                    <a:lumMod val="60000"/>
-                    <a:lumOff val="40000"/>
-                  </a:schemeClr>
-                </a:gs>
-              </a:gsLst>
-              <a:lin ang="16200000" scaled="1"/>
-              <a:tileRect/>
-            </a:gradFill>
-          </a:ln>
-        </p:spPr>
-        <p:style>
-          <a:lnRef idx="2">
-            <a:schemeClr val="accent1">
-              <a:shade val="50000"/>
-            </a:schemeClr>
-          </a:lnRef>
-          <a:fillRef idx="1">
-            <a:schemeClr val="accent1"/>
-          </a:fillRef>
-          <a:effectRef idx="0">
-            <a:schemeClr val="accent1"/>
-          </a:effectRef>
-          <a:fontRef idx="minor">
-            <a:schemeClr val="lt1"/>
-          </a:fontRef>
-        </p:style>
-        <p:txBody>
-          <a:bodyPr rtlCol="0" anchor="ctr"/>
-          <a:lstStyle/>
-          <a:p>
-            <a:pPr algn="ctr"/>
-            <a:endParaRPr lang="en-US" dirty="0"/>
-          </a:p>
-        </p:txBody>
-      </p:sp>
       <p:grpSp>
         <p:nvGrpSpPr>
           <p:cNvPr id="18" name="Group 17"/>
@@ -3206,8 +2956,8 @@
         </p:nvGrpSpPr>
         <p:grpSpPr>
           <a:xfrm>
-            <a:off x="5874327" y="2058483"/>
-            <a:ext cx="1557882" cy="1551447"/>
+            <a:off x="2210827" y="2441941"/>
+            <a:ext cx="457200" cy="457200"/>
             <a:chOff x="5874327" y="2058483"/>
             <a:chExt cx="1557882" cy="1551447"/>
           </a:xfrm>
@@ -3221,7 +2971,7 @@
             <p:nvPr/>
           </p:nvPicPr>
           <p:blipFill rotWithShape="1">
-            <a:blip r:embed="rId3">
+            <a:blip r:embed="rId2" cstate="print">
               <a:extLst>
                 <a:ext uri="{28A0092B-C50C-407E-A947-70E740481C1C}">
                   <a14:useLocalDpi xmlns:a14="http://schemas.microsoft.com/office/drawing/2010/main" val="0"/>
@@ -3249,7 +2999,7 @@
           </p:nvSpPr>
           <p:spPr>
             <a:xfrm>
-              <a:off x="6171133" y="2357203"/>
+              <a:off x="6182931" y="2357203"/>
               <a:ext cx="948059" cy="948059"/>
             </a:xfrm>
             <a:prstGeom prst="ellipse">
@@ -3300,7 +3050,7 @@
             <a:lstStyle/>
             <a:p>
               <a:pPr algn="ctr"/>
-              <a:endParaRPr lang="en-US" b="1">
+              <a:endParaRPr lang="en-US" b="1" dirty="0">
                 <a:ln w="22225">
                   <a:solidFill>
                     <a:schemeClr val="accent2"/>
@@ -3317,78 +3067,6 @@
             </a:p>
           </p:txBody>
         </p:sp>
-        <p:sp>
-          <p:nvSpPr>
-            <p:cNvPr id="9" name="Rectangle 8"/>
-            <p:cNvSpPr/>
-            <p:nvPr/>
-          </p:nvSpPr>
-          <p:spPr>
-            <a:xfrm>
-              <a:off x="6300356" y="2182919"/>
-              <a:ext cx="689612" cy="1200329"/>
-            </a:xfrm>
-            <a:prstGeom prst="rect">
-              <a:avLst/>
-            </a:prstGeom>
-            <a:noFill/>
-          </p:spPr>
-          <p:txBody>
-            <a:bodyPr wrap="none" lIns="91440" tIns="45720" rIns="91440" bIns="45720">
-              <a:spAutoFit/>
-            </a:bodyPr>
-            <a:lstStyle/>
-            <a:p>
-              <a:pPr algn="ctr"/>
-              <a:r>
-                <a:rPr lang="en-US" sz="7200" b="1" dirty="0" smtClean="0">
-                  <a:ln w="10160">
-                    <a:solidFill>
-                      <a:schemeClr val="accent5"/>
-                    </a:solidFill>
-                    <a:prstDash val="solid"/>
-                  </a:ln>
-                  <a:solidFill>
-                    <a:srgbClr val="FFFFFF"/>
-                  </a:solidFill>
-                  <a:effectLst>
-                    <a:outerShdw blurRad="38100" dist="22860" dir="5400000" algn="tl" rotWithShape="0">
-                      <a:srgbClr val="000000">
-                        <a:alpha val="30000"/>
-                      </a:srgbClr>
-                    </a:outerShdw>
-                  </a:effectLst>
-                </a:rPr>
-                <a:t>K</a:t>
-              </a:r>
-              <a:endParaRPr lang="en-US" sz="7200" b="0" cap="none" spc="0" dirty="0">
-                <a:ln w="0"/>
-                <a:gradFill>
-                  <a:gsLst>
-                    <a:gs pos="0">
-                      <a:schemeClr val="accent5">
-                        <a:lumMod val="50000"/>
-                      </a:schemeClr>
-                    </a:gs>
-                    <a:gs pos="50000">
-                      <a:schemeClr val="accent5"/>
-                    </a:gs>
-                    <a:gs pos="100000">
-                      <a:schemeClr val="accent5">
-                        <a:lumMod val="60000"/>
-                        <a:lumOff val="40000"/>
-                      </a:schemeClr>
-                    </a:gs>
-                  </a:gsLst>
-                  <a:lin ang="5400000"/>
-                </a:gradFill>
-                <a:effectLst>
-                  <a:reflection blurRad="6350" stA="53000" endA="300" endPos="35500" dir="5400000" sy="-90000" algn="bl" rotWithShape="0"/>
-                </a:effectLst>
-              </a:endParaRPr>
-            </a:p>
-          </p:txBody>
-        </p:sp>
       </p:grpSp>
     </p:spTree>
     <p:extLst>
@@ -3400,13 +3078,6 @@
   <p:clrMapOvr>
     <a:masterClrMapping/>
   </p:clrMapOvr>
-  <p:timing>
-    <p:tnLst>
-      <p:par>
-        <p:cTn id="1" dur="indefinite" restart="never" nodeType="tmRoot"/>
-      </p:par>
-    </p:tnLst>
-  </p:timing>
 </p:sld>
 </file>
 

</xml_diff>